<commit_message>
making the residuals larger in the powerpoint file
</commit_message>
<xml_diff>
--- a/pearsons_std_residuals.pptx
+++ b/pearsons_std_residuals.pptx
@@ -4575,96 +4575,6 @@
           <a:chExt cx="0" cy="0"/>
         </a:xfrm>
       </p:grpSpPr>
-      <p:pic>
-        <p:nvPicPr>
-          <p:cNvPr id="11" name="Picture 10">
-            <a:extLst>
-              <a:ext uri="{FF2B5EF4-FFF2-40B4-BE49-F238E27FC236}">
-                <a16:creationId xmlns:a16="http://schemas.microsoft.com/office/drawing/2014/main" id="{365794A1-5816-DE45-8840-31B000EFCDA0}"/>
-              </a:ext>
-            </a:extLst>
-          </p:cNvPr>
-          <p:cNvPicPr>
-            <a:picLocks noChangeAspect="1"/>
-          </p:cNvPicPr>
-          <p:nvPr/>
-        </p:nvPicPr>
-        <p:blipFill>
-          <a:blip r:embed="rId2"/>
-          <a:stretch>
-            <a:fillRect/>
-          </a:stretch>
-        </p:blipFill>
-        <p:spPr>
-          <a:xfrm>
-            <a:off x="144914" y="1583811"/>
-            <a:ext cx="3637154" cy="3826486"/>
-          </a:xfrm>
-          <a:prstGeom prst="rect">
-            <a:avLst/>
-          </a:prstGeom>
-        </p:spPr>
-      </p:pic>
-      <p:pic>
-        <p:nvPicPr>
-          <p:cNvPr id="12" name="Picture 11">
-            <a:extLst>
-              <a:ext uri="{FF2B5EF4-FFF2-40B4-BE49-F238E27FC236}">
-                <a16:creationId xmlns:a16="http://schemas.microsoft.com/office/drawing/2014/main" id="{62B02E1D-1212-E845-9BC8-6676B9072BE1}"/>
-              </a:ext>
-            </a:extLst>
-          </p:cNvPr>
-          <p:cNvPicPr>
-            <a:picLocks noChangeAspect="1"/>
-          </p:cNvPicPr>
-          <p:nvPr/>
-        </p:nvPicPr>
-        <p:blipFill>
-          <a:blip r:embed="rId3"/>
-          <a:stretch>
-            <a:fillRect/>
-          </a:stretch>
-        </p:blipFill>
-        <p:spPr>
-          <a:xfrm>
-            <a:off x="4095703" y="1604699"/>
-            <a:ext cx="3616679" cy="3826486"/>
-          </a:xfrm>
-          <a:prstGeom prst="rect">
-            <a:avLst/>
-          </a:prstGeom>
-        </p:spPr>
-      </p:pic>
-      <p:pic>
-        <p:nvPicPr>
-          <p:cNvPr id="13" name="Picture 12">
-            <a:extLst>
-              <a:ext uri="{FF2B5EF4-FFF2-40B4-BE49-F238E27FC236}">
-                <a16:creationId xmlns:a16="http://schemas.microsoft.com/office/drawing/2014/main" id="{14353566-38B9-8F42-AECD-E2038929E841}"/>
-              </a:ext>
-            </a:extLst>
-          </p:cNvPr>
-          <p:cNvPicPr>
-            <a:picLocks noChangeAspect="1"/>
-          </p:cNvPicPr>
-          <p:nvPr/>
-        </p:nvPicPr>
-        <p:blipFill>
-          <a:blip r:embed="rId4"/>
-          <a:stretch>
-            <a:fillRect/>
-          </a:stretch>
-        </p:blipFill>
-        <p:spPr>
-          <a:xfrm>
-            <a:off x="8175507" y="1629431"/>
-            <a:ext cx="3616679" cy="3766129"/>
-          </a:xfrm>
-          <a:prstGeom prst="rect">
-            <a:avLst/>
-          </a:prstGeom>
-        </p:spPr>
-      </p:pic>
       <p:sp>
         <p:nvSpPr>
           <p:cNvPr id="14" name="Rectangle 13">
@@ -4830,6 +4740,897 @@
           </a:p>
         </p:txBody>
       </p:sp>
+      <p:grpSp>
+        <p:nvGrpSpPr>
+          <p:cNvPr id="2" name="Group 1">
+            <a:extLst>
+              <a:ext uri="{FF2B5EF4-FFF2-40B4-BE49-F238E27FC236}">
+                <a16:creationId xmlns:a16="http://schemas.microsoft.com/office/drawing/2014/main" id="{EA6E5BC7-ECA6-1846-BC4C-78DBB510334C}"/>
+              </a:ext>
+            </a:extLst>
+          </p:cNvPr>
+          <p:cNvGrpSpPr/>
+          <p:nvPr/>
+        </p:nvGrpSpPr>
+        <p:grpSpPr>
+          <a:xfrm>
+            <a:off x="144914" y="1583811"/>
+            <a:ext cx="3637154" cy="3826486"/>
+            <a:chOff x="144914" y="1583811"/>
+            <a:chExt cx="3637154" cy="3826486"/>
+          </a:xfrm>
+        </p:grpSpPr>
+        <p:pic>
+          <p:nvPicPr>
+            <p:cNvPr id="11" name="Picture 10">
+              <a:extLst>
+                <a:ext uri="{FF2B5EF4-FFF2-40B4-BE49-F238E27FC236}">
+                  <a16:creationId xmlns:a16="http://schemas.microsoft.com/office/drawing/2014/main" id="{365794A1-5816-DE45-8840-31B000EFCDA0}"/>
+                </a:ext>
+              </a:extLst>
+            </p:cNvPr>
+            <p:cNvPicPr>
+              <a:picLocks noChangeAspect="1"/>
+            </p:cNvPicPr>
+            <p:nvPr/>
+          </p:nvPicPr>
+          <p:blipFill>
+            <a:blip r:embed="rId2"/>
+            <a:stretch>
+              <a:fillRect/>
+            </a:stretch>
+          </p:blipFill>
+          <p:spPr>
+            <a:xfrm>
+              <a:off x="144914" y="1583811"/>
+              <a:ext cx="3637154" cy="3826486"/>
+            </a:xfrm>
+            <a:prstGeom prst="rect">
+              <a:avLst/>
+            </a:prstGeom>
+          </p:spPr>
+        </p:pic>
+        <p:sp>
+          <p:nvSpPr>
+            <p:cNvPr id="9" name="TextBox 8">
+              <a:extLst>
+                <a:ext uri="{FF2B5EF4-FFF2-40B4-BE49-F238E27FC236}">
+                  <a16:creationId xmlns:a16="http://schemas.microsoft.com/office/drawing/2014/main" id="{C8241153-8DEC-E84A-8E0E-2EBC2D5DDFC4}"/>
+                </a:ext>
+              </a:extLst>
+            </p:cNvPr>
+            <p:cNvSpPr txBox="1"/>
+            <p:nvPr/>
+          </p:nvSpPr>
+          <p:spPr>
+            <a:xfrm>
+              <a:off x="1800625" y="2512080"/>
+              <a:ext cx="755441" cy="461665"/>
+            </a:xfrm>
+            <a:prstGeom prst="rect">
+              <a:avLst/>
+            </a:prstGeom>
+            <a:solidFill>
+              <a:srgbClr val="002F63"/>
+            </a:solidFill>
+          </p:spPr>
+          <p:txBody>
+            <a:bodyPr wrap="square" rtlCol="0">
+              <a:spAutoFit/>
+            </a:bodyPr>
+            <a:lstStyle/>
+            <a:p>
+              <a:r>
+                <a:rPr lang="de-DE" sz="2400" b="1" dirty="0">
+                  <a:solidFill>
+                    <a:schemeClr val="bg1"/>
+                  </a:solidFill>
+                </a:rPr>
+                <a:t>5.37</a:t>
+              </a:r>
+            </a:p>
+          </p:txBody>
+        </p:sp>
+        <p:sp>
+          <p:nvSpPr>
+            <p:cNvPr id="10" name="TextBox 9">
+              <a:extLst>
+                <a:ext uri="{FF2B5EF4-FFF2-40B4-BE49-F238E27FC236}">
+                  <a16:creationId xmlns:a16="http://schemas.microsoft.com/office/drawing/2014/main" id="{124FF30A-E27E-B342-B2B7-74DC7E7C99C8}"/>
+                </a:ext>
+              </a:extLst>
+            </p:cNvPr>
+            <p:cNvSpPr txBox="1"/>
+            <p:nvPr/>
+          </p:nvSpPr>
+          <p:spPr>
+            <a:xfrm>
+              <a:off x="2855883" y="2551363"/>
+              <a:ext cx="703897" cy="369332"/>
+            </a:xfrm>
+            <a:prstGeom prst="rect">
+              <a:avLst/>
+            </a:prstGeom>
+            <a:solidFill>
+              <a:srgbClr val="A90020"/>
+            </a:solidFill>
+          </p:spPr>
+          <p:txBody>
+            <a:bodyPr wrap="square" rtlCol="0">
+              <a:spAutoFit/>
+            </a:bodyPr>
+            <a:lstStyle/>
+            <a:p>
+              <a:r>
+                <a:rPr lang="de-DE" b="1" dirty="0">
+                  <a:solidFill>
+                    <a:schemeClr val="bg1"/>
+                  </a:solidFill>
+                </a:rPr>
+                <a:t>-4.59</a:t>
+              </a:r>
+            </a:p>
+          </p:txBody>
+        </p:sp>
+        <p:sp>
+          <p:nvSpPr>
+            <p:cNvPr id="18" name="TextBox 17">
+              <a:extLst>
+                <a:ext uri="{FF2B5EF4-FFF2-40B4-BE49-F238E27FC236}">
+                  <a16:creationId xmlns:a16="http://schemas.microsoft.com/office/drawing/2014/main" id="{DB3BF3C1-8662-3240-9694-782D8DDB427A}"/>
+                </a:ext>
+              </a:extLst>
+            </p:cNvPr>
+            <p:cNvSpPr txBox="1"/>
+            <p:nvPr/>
+          </p:nvSpPr>
+          <p:spPr>
+            <a:xfrm>
+              <a:off x="1822015" y="3607478"/>
+              <a:ext cx="644611" cy="353943"/>
+            </a:xfrm>
+            <a:prstGeom prst="rect">
+              <a:avLst/>
+            </a:prstGeom>
+            <a:solidFill>
+              <a:srgbClr val="D83437"/>
+            </a:solidFill>
+          </p:spPr>
+          <p:txBody>
+            <a:bodyPr wrap="square" rtlCol="0">
+              <a:spAutoFit/>
+            </a:bodyPr>
+            <a:lstStyle/>
+            <a:p>
+              <a:r>
+                <a:rPr lang="de-DE" sz="1700" b="1" dirty="0">
+                  <a:solidFill>
+                    <a:schemeClr val="bg1"/>
+                  </a:solidFill>
+                </a:rPr>
+                <a:t>-3.64</a:t>
+              </a:r>
+            </a:p>
+          </p:txBody>
+        </p:sp>
+        <p:sp>
+          <p:nvSpPr>
+            <p:cNvPr id="19" name="TextBox 18">
+              <a:extLst>
+                <a:ext uri="{FF2B5EF4-FFF2-40B4-BE49-F238E27FC236}">
+                  <a16:creationId xmlns:a16="http://schemas.microsoft.com/office/drawing/2014/main" id="{EB09941A-F3A9-6744-AA24-385C03888DCC}"/>
+                </a:ext>
+              </a:extLst>
+            </p:cNvPr>
+            <p:cNvSpPr txBox="1"/>
+            <p:nvPr/>
+          </p:nvSpPr>
+          <p:spPr>
+            <a:xfrm>
+              <a:off x="2919613" y="3605081"/>
+              <a:ext cx="576435" cy="353943"/>
+            </a:xfrm>
+            <a:prstGeom prst="rect">
+              <a:avLst/>
+            </a:prstGeom>
+            <a:solidFill>
+              <a:srgbClr val="2699CA"/>
+            </a:solidFill>
+          </p:spPr>
+          <p:txBody>
+            <a:bodyPr wrap="square" rtlCol="0">
+              <a:spAutoFit/>
+            </a:bodyPr>
+            <a:lstStyle/>
+            <a:p>
+              <a:r>
+                <a:rPr lang="de-DE" sz="1700" b="1" dirty="0">
+                  <a:solidFill>
+                    <a:schemeClr val="bg1"/>
+                  </a:solidFill>
+                </a:rPr>
+                <a:t>3.11</a:t>
+              </a:r>
+            </a:p>
+          </p:txBody>
+        </p:sp>
+        <p:sp>
+          <p:nvSpPr>
+            <p:cNvPr id="20" name="TextBox 19">
+              <a:extLst>
+                <a:ext uri="{FF2B5EF4-FFF2-40B4-BE49-F238E27FC236}">
+                  <a16:creationId xmlns:a16="http://schemas.microsoft.com/office/drawing/2014/main" id="{004BEBB5-91E5-FD43-A6A0-8C702B5D24AE}"/>
+                </a:ext>
+              </a:extLst>
+            </p:cNvPr>
+            <p:cNvSpPr txBox="1"/>
+            <p:nvPr/>
+          </p:nvSpPr>
+          <p:spPr>
+            <a:xfrm>
+              <a:off x="1822014" y="4649949"/>
+              <a:ext cx="644611" cy="353943"/>
+            </a:xfrm>
+            <a:prstGeom prst="rect">
+              <a:avLst/>
+            </a:prstGeom>
+            <a:solidFill>
+              <a:srgbClr val="C50027"/>
+            </a:solidFill>
+          </p:spPr>
+          <p:txBody>
+            <a:bodyPr wrap="square" rtlCol="0">
+              <a:spAutoFit/>
+            </a:bodyPr>
+            <a:lstStyle/>
+            <a:p>
+              <a:r>
+                <a:rPr lang="de-DE" sz="1700" b="1" dirty="0">
+                  <a:solidFill>
+                    <a:schemeClr val="bg1"/>
+                  </a:solidFill>
+                </a:rPr>
+                <a:t>-4.17</a:t>
+              </a:r>
+            </a:p>
+          </p:txBody>
+        </p:sp>
+        <p:sp>
+          <p:nvSpPr>
+            <p:cNvPr id="21" name="TextBox 20">
+              <a:extLst>
+                <a:ext uri="{FF2B5EF4-FFF2-40B4-BE49-F238E27FC236}">
+                  <a16:creationId xmlns:a16="http://schemas.microsoft.com/office/drawing/2014/main" id="{56E782FC-051A-0149-9C6B-CD18C58EDCC7}"/>
+                </a:ext>
+              </a:extLst>
+            </p:cNvPr>
+            <p:cNvSpPr txBox="1"/>
+            <p:nvPr/>
+          </p:nvSpPr>
+          <p:spPr>
+            <a:xfrm>
+              <a:off x="2885524" y="4634168"/>
+              <a:ext cx="644611" cy="400110"/>
+            </a:xfrm>
+            <a:prstGeom prst="rect">
+              <a:avLst/>
+            </a:prstGeom>
+            <a:solidFill>
+              <a:srgbClr val="0084C0"/>
+            </a:solidFill>
+          </p:spPr>
+          <p:txBody>
+            <a:bodyPr wrap="square" rtlCol="0">
+              <a:spAutoFit/>
+            </a:bodyPr>
+            <a:lstStyle/>
+            <a:p>
+              <a:r>
+                <a:rPr lang="de-DE" sz="2000" b="1" dirty="0">
+                  <a:solidFill>
+                    <a:schemeClr val="bg1"/>
+                  </a:solidFill>
+                </a:rPr>
+                <a:t>3.57</a:t>
+              </a:r>
+            </a:p>
+          </p:txBody>
+        </p:sp>
+      </p:grpSp>
+      <p:grpSp>
+        <p:nvGrpSpPr>
+          <p:cNvPr id="3" name="Group 2">
+            <a:extLst>
+              <a:ext uri="{FF2B5EF4-FFF2-40B4-BE49-F238E27FC236}">
+                <a16:creationId xmlns:a16="http://schemas.microsoft.com/office/drawing/2014/main" id="{C90E57BB-6E44-C044-9A38-822F027F63D8}"/>
+              </a:ext>
+            </a:extLst>
+          </p:cNvPr>
+          <p:cNvGrpSpPr/>
+          <p:nvPr/>
+        </p:nvGrpSpPr>
+        <p:grpSpPr>
+          <a:xfrm>
+            <a:off x="4095703" y="1604699"/>
+            <a:ext cx="3616679" cy="3826486"/>
+            <a:chOff x="4095703" y="1604699"/>
+            <a:chExt cx="3616679" cy="3826486"/>
+          </a:xfrm>
+        </p:grpSpPr>
+        <p:pic>
+          <p:nvPicPr>
+            <p:cNvPr id="12" name="Picture 11">
+              <a:extLst>
+                <a:ext uri="{FF2B5EF4-FFF2-40B4-BE49-F238E27FC236}">
+                  <a16:creationId xmlns:a16="http://schemas.microsoft.com/office/drawing/2014/main" id="{62B02E1D-1212-E845-9BC8-6676B9072BE1}"/>
+                </a:ext>
+              </a:extLst>
+            </p:cNvPr>
+            <p:cNvPicPr>
+              <a:picLocks noChangeAspect="1"/>
+            </p:cNvPicPr>
+            <p:nvPr/>
+          </p:nvPicPr>
+          <p:blipFill>
+            <a:blip r:embed="rId3"/>
+            <a:stretch>
+              <a:fillRect/>
+            </a:stretch>
+          </p:blipFill>
+          <p:spPr>
+            <a:xfrm>
+              <a:off x="4095703" y="1604699"/>
+              <a:ext cx="3616679" cy="3826486"/>
+            </a:xfrm>
+            <a:prstGeom prst="rect">
+              <a:avLst/>
+            </a:prstGeom>
+          </p:spPr>
+        </p:pic>
+        <p:sp>
+          <p:nvSpPr>
+            <p:cNvPr id="22" name="TextBox 21">
+              <a:extLst>
+                <a:ext uri="{FF2B5EF4-FFF2-40B4-BE49-F238E27FC236}">
+                  <a16:creationId xmlns:a16="http://schemas.microsoft.com/office/drawing/2014/main" id="{EC4BFBEA-9E05-B849-A9DF-91BBA117A6DF}"/>
+                </a:ext>
+              </a:extLst>
+            </p:cNvPr>
+            <p:cNvSpPr txBox="1"/>
+            <p:nvPr/>
+          </p:nvSpPr>
+          <p:spPr>
+            <a:xfrm>
+              <a:off x="5731434" y="2505505"/>
+              <a:ext cx="755441" cy="461665"/>
+            </a:xfrm>
+            <a:prstGeom prst="rect">
+              <a:avLst/>
+            </a:prstGeom>
+            <a:solidFill>
+              <a:srgbClr val="002F63"/>
+            </a:solidFill>
+          </p:spPr>
+          <p:txBody>
+            <a:bodyPr wrap="square" rtlCol="0">
+              <a:spAutoFit/>
+            </a:bodyPr>
+            <a:lstStyle/>
+            <a:p>
+              <a:r>
+                <a:rPr lang="de-DE" sz="2400" b="1" dirty="0">
+                  <a:solidFill>
+                    <a:schemeClr val="bg1"/>
+                  </a:solidFill>
+                </a:rPr>
+                <a:t>4.33</a:t>
+              </a:r>
+            </a:p>
+          </p:txBody>
+        </p:sp>
+        <p:sp>
+          <p:nvSpPr>
+            <p:cNvPr id="23" name="TextBox 22">
+              <a:extLst>
+                <a:ext uri="{FF2B5EF4-FFF2-40B4-BE49-F238E27FC236}">
+                  <a16:creationId xmlns:a16="http://schemas.microsoft.com/office/drawing/2014/main" id="{52F65FE4-DF28-7A41-9F41-63311F7F8109}"/>
+                </a:ext>
+              </a:extLst>
+            </p:cNvPr>
+            <p:cNvSpPr txBox="1"/>
+            <p:nvPr/>
+          </p:nvSpPr>
+          <p:spPr>
+            <a:xfrm>
+              <a:off x="6808984" y="2570042"/>
+              <a:ext cx="644611" cy="353943"/>
+            </a:xfrm>
+            <a:prstGeom prst="rect">
+              <a:avLst/>
+            </a:prstGeom>
+            <a:solidFill>
+              <a:srgbClr val="D83437"/>
+            </a:solidFill>
+          </p:spPr>
+          <p:txBody>
+            <a:bodyPr wrap="square" rtlCol="0">
+              <a:spAutoFit/>
+            </a:bodyPr>
+            <a:lstStyle/>
+            <a:p>
+              <a:r>
+                <a:rPr lang="de-DE" sz="1700" b="1" dirty="0">
+                  <a:solidFill>
+                    <a:schemeClr val="bg1"/>
+                  </a:solidFill>
+                </a:rPr>
+                <a:t>-2.86</a:t>
+              </a:r>
+            </a:p>
+          </p:txBody>
+        </p:sp>
+        <p:sp>
+          <p:nvSpPr>
+            <p:cNvPr id="24" name="TextBox 23">
+              <a:extLst>
+                <a:ext uri="{FF2B5EF4-FFF2-40B4-BE49-F238E27FC236}">
+                  <a16:creationId xmlns:a16="http://schemas.microsoft.com/office/drawing/2014/main" id="{BACCAD3C-081E-A843-9AA2-65DD3464F6B7}"/>
+                </a:ext>
+              </a:extLst>
+            </p:cNvPr>
+            <p:cNvSpPr txBox="1"/>
+            <p:nvPr/>
+          </p:nvSpPr>
+          <p:spPr>
+            <a:xfrm>
+              <a:off x="5764324" y="3598507"/>
+              <a:ext cx="644611" cy="353943"/>
+            </a:xfrm>
+            <a:prstGeom prst="rect">
+              <a:avLst/>
+            </a:prstGeom>
+            <a:solidFill>
+              <a:srgbClr val="D12130"/>
+            </a:solidFill>
+          </p:spPr>
+          <p:txBody>
+            <a:bodyPr wrap="square" rtlCol="0">
+              <a:spAutoFit/>
+            </a:bodyPr>
+            <a:lstStyle/>
+            <a:p>
+              <a:r>
+                <a:rPr lang="de-DE" sz="1700" b="1" dirty="0">
+                  <a:solidFill>
+                    <a:schemeClr val="bg1"/>
+                  </a:solidFill>
+                </a:rPr>
+                <a:t>-3.12</a:t>
+              </a:r>
+            </a:p>
+          </p:txBody>
+        </p:sp>
+        <p:sp>
+          <p:nvSpPr>
+            <p:cNvPr id="25" name="TextBox 24">
+              <a:extLst>
+                <a:ext uri="{FF2B5EF4-FFF2-40B4-BE49-F238E27FC236}">
+                  <a16:creationId xmlns:a16="http://schemas.microsoft.com/office/drawing/2014/main" id="{95053914-E74D-F642-9B98-C2BF89927F14}"/>
+                </a:ext>
+              </a:extLst>
+            </p:cNvPr>
+            <p:cNvSpPr txBox="1"/>
+            <p:nvPr/>
+          </p:nvSpPr>
+          <p:spPr>
+            <a:xfrm>
+              <a:off x="6880701" y="3621010"/>
+              <a:ext cx="526598" cy="323165"/>
+            </a:xfrm>
+            <a:prstGeom prst="rect">
+              <a:avLst/>
+            </a:prstGeom>
+            <a:solidFill>
+              <a:srgbClr val="5FB3D7"/>
+            </a:solidFill>
+          </p:spPr>
+          <p:txBody>
+            <a:bodyPr wrap="square" rtlCol="0">
+              <a:spAutoFit/>
+            </a:bodyPr>
+            <a:lstStyle/>
+            <a:p>
+              <a:r>
+                <a:rPr lang="de-DE" sz="1500" b="1" dirty="0">
+                  <a:solidFill>
+                    <a:schemeClr val="bg1"/>
+                  </a:solidFill>
+                </a:rPr>
+                <a:t>2.06</a:t>
+              </a:r>
+            </a:p>
+          </p:txBody>
+        </p:sp>
+        <p:sp>
+          <p:nvSpPr>
+            <p:cNvPr id="26" name="TextBox 25">
+              <a:extLst>
+                <a:ext uri="{FF2B5EF4-FFF2-40B4-BE49-F238E27FC236}">
+                  <a16:creationId xmlns:a16="http://schemas.microsoft.com/office/drawing/2014/main" id="{9E2BB74C-65D1-1340-9959-0BB03715032E}"/>
+                </a:ext>
+              </a:extLst>
+            </p:cNvPr>
+            <p:cNvSpPr txBox="1"/>
+            <p:nvPr/>
+          </p:nvSpPr>
+          <p:spPr>
+            <a:xfrm>
+              <a:off x="5764323" y="4654213"/>
+              <a:ext cx="644611" cy="353943"/>
+            </a:xfrm>
+            <a:prstGeom prst="rect">
+              <a:avLst/>
+            </a:prstGeom>
+            <a:solidFill>
+              <a:srgbClr val="D73035"/>
+            </a:solidFill>
+          </p:spPr>
+          <p:txBody>
+            <a:bodyPr wrap="square" rtlCol="0">
+              <a:spAutoFit/>
+            </a:bodyPr>
+            <a:lstStyle/>
+            <a:p>
+              <a:r>
+                <a:rPr lang="de-DE" sz="1700" b="1" dirty="0">
+                  <a:solidFill>
+                    <a:schemeClr val="bg1"/>
+                  </a:solidFill>
+                </a:rPr>
+                <a:t>-2.98</a:t>
+              </a:r>
+            </a:p>
+          </p:txBody>
+        </p:sp>
+        <p:sp>
+          <p:nvSpPr>
+            <p:cNvPr id="27" name="TextBox 26">
+              <a:extLst>
+                <a:ext uri="{FF2B5EF4-FFF2-40B4-BE49-F238E27FC236}">
+                  <a16:creationId xmlns:a16="http://schemas.microsoft.com/office/drawing/2014/main" id="{37EEC6E3-6481-074B-857E-9C8E192004EC}"/>
+                </a:ext>
+              </a:extLst>
+            </p:cNvPr>
+            <p:cNvSpPr txBox="1"/>
+            <p:nvPr/>
+          </p:nvSpPr>
+          <p:spPr>
+            <a:xfrm>
+              <a:off x="6888377" y="4681231"/>
+              <a:ext cx="526598" cy="323165"/>
+            </a:xfrm>
+            <a:prstGeom prst="rect">
+              <a:avLst/>
+            </a:prstGeom>
+            <a:solidFill>
+              <a:srgbClr val="69B8DA"/>
+            </a:solidFill>
+          </p:spPr>
+          <p:txBody>
+            <a:bodyPr wrap="square" rtlCol="0">
+              <a:spAutoFit/>
+            </a:bodyPr>
+            <a:lstStyle/>
+            <a:p>
+              <a:r>
+                <a:rPr lang="de-DE" sz="1500" b="1" dirty="0">
+                  <a:solidFill>
+                    <a:schemeClr val="bg1"/>
+                  </a:solidFill>
+                </a:rPr>
+                <a:t>1.97</a:t>
+              </a:r>
+            </a:p>
+          </p:txBody>
+        </p:sp>
+      </p:grpSp>
+      <p:grpSp>
+        <p:nvGrpSpPr>
+          <p:cNvPr id="4" name="Group 3">
+            <a:extLst>
+              <a:ext uri="{FF2B5EF4-FFF2-40B4-BE49-F238E27FC236}">
+                <a16:creationId xmlns:a16="http://schemas.microsoft.com/office/drawing/2014/main" id="{D1882A33-2CF0-2F46-A710-207E1E877E04}"/>
+              </a:ext>
+            </a:extLst>
+          </p:cNvPr>
+          <p:cNvGrpSpPr/>
+          <p:nvPr/>
+        </p:nvGrpSpPr>
+        <p:grpSpPr>
+          <a:xfrm>
+            <a:off x="8175507" y="1629431"/>
+            <a:ext cx="3616679" cy="3766129"/>
+            <a:chOff x="8175507" y="1629431"/>
+            <a:chExt cx="3616679" cy="3766129"/>
+          </a:xfrm>
+        </p:grpSpPr>
+        <p:pic>
+          <p:nvPicPr>
+            <p:cNvPr id="13" name="Picture 12">
+              <a:extLst>
+                <a:ext uri="{FF2B5EF4-FFF2-40B4-BE49-F238E27FC236}">
+                  <a16:creationId xmlns:a16="http://schemas.microsoft.com/office/drawing/2014/main" id="{14353566-38B9-8F42-AECD-E2038929E841}"/>
+                </a:ext>
+              </a:extLst>
+            </p:cNvPr>
+            <p:cNvPicPr>
+              <a:picLocks noChangeAspect="1"/>
+            </p:cNvPicPr>
+            <p:nvPr/>
+          </p:nvPicPr>
+          <p:blipFill>
+            <a:blip r:embed="rId4"/>
+            <a:stretch>
+              <a:fillRect/>
+            </a:stretch>
+          </p:blipFill>
+          <p:spPr>
+            <a:xfrm>
+              <a:off x="8175507" y="1629431"/>
+              <a:ext cx="3616679" cy="3766129"/>
+            </a:xfrm>
+            <a:prstGeom prst="rect">
+              <a:avLst/>
+            </a:prstGeom>
+          </p:spPr>
+        </p:pic>
+        <p:sp>
+          <p:nvSpPr>
+            <p:cNvPr id="28" name="TextBox 27">
+              <a:extLst>
+                <a:ext uri="{FF2B5EF4-FFF2-40B4-BE49-F238E27FC236}">
+                  <a16:creationId xmlns:a16="http://schemas.microsoft.com/office/drawing/2014/main" id="{118F88A5-AC61-AA4D-9839-2B10C4869DAD}"/>
+                </a:ext>
+              </a:extLst>
+            </p:cNvPr>
+            <p:cNvSpPr txBox="1"/>
+            <p:nvPr/>
+          </p:nvSpPr>
+          <p:spPr>
+            <a:xfrm>
+              <a:off x="9830885" y="2518660"/>
+              <a:ext cx="755441" cy="461665"/>
+            </a:xfrm>
+            <a:prstGeom prst="rect">
+              <a:avLst/>
+            </a:prstGeom>
+            <a:solidFill>
+              <a:srgbClr val="002F63"/>
+            </a:solidFill>
+          </p:spPr>
+          <p:txBody>
+            <a:bodyPr wrap="square" rtlCol="0">
+              <a:spAutoFit/>
+            </a:bodyPr>
+            <a:lstStyle/>
+            <a:p>
+              <a:r>
+                <a:rPr lang="de-DE" sz="2400" b="1" dirty="0">
+                  <a:solidFill>
+                    <a:schemeClr val="bg1"/>
+                  </a:solidFill>
+                </a:rPr>
+                <a:t>5.35</a:t>
+              </a:r>
+            </a:p>
+          </p:txBody>
+        </p:sp>
+        <p:sp>
+          <p:nvSpPr>
+            <p:cNvPr id="29" name="TextBox 28">
+              <a:extLst>
+                <a:ext uri="{FF2B5EF4-FFF2-40B4-BE49-F238E27FC236}">
+                  <a16:creationId xmlns:a16="http://schemas.microsoft.com/office/drawing/2014/main" id="{2A62D3DF-BF8D-1D49-8923-A62E6390E3E1}"/>
+                </a:ext>
+              </a:extLst>
+            </p:cNvPr>
+            <p:cNvSpPr txBox="1"/>
+            <p:nvPr/>
+          </p:nvSpPr>
+          <p:spPr>
+            <a:xfrm>
+              <a:off x="10851634" y="2546072"/>
+              <a:ext cx="755441" cy="400110"/>
+            </a:xfrm>
+            <a:prstGeom prst="rect">
+              <a:avLst/>
+            </a:prstGeom>
+            <a:solidFill>
+              <a:srgbClr val="74001D"/>
+            </a:solidFill>
+          </p:spPr>
+          <p:txBody>
+            <a:bodyPr wrap="square" rtlCol="0">
+              <a:spAutoFit/>
+            </a:bodyPr>
+            <a:lstStyle/>
+            <a:p>
+              <a:r>
+                <a:rPr lang="de-DE" sz="2000" b="1" dirty="0">
+                  <a:solidFill>
+                    <a:schemeClr val="bg1"/>
+                  </a:solidFill>
+                </a:rPr>
+                <a:t>-5.28</a:t>
+              </a:r>
+            </a:p>
+          </p:txBody>
+        </p:sp>
+        <p:sp>
+          <p:nvSpPr>
+            <p:cNvPr id="30" name="TextBox 29">
+              <a:extLst>
+                <a:ext uri="{FF2B5EF4-FFF2-40B4-BE49-F238E27FC236}">
+                  <a16:creationId xmlns:a16="http://schemas.microsoft.com/office/drawing/2014/main" id="{C6CFF6DA-37BA-D847-AFE2-9B1EF9C027C6}"/>
+                </a:ext>
+              </a:extLst>
+            </p:cNvPr>
+            <p:cNvSpPr txBox="1"/>
+            <p:nvPr/>
+          </p:nvSpPr>
+          <p:spPr>
+            <a:xfrm>
+              <a:off x="9840492" y="3612881"/>
+              <a:ext cx="696238" cy="369332"/>
+            </a:xfrm>
+            <a:prstGeom prst="rect">
+              <a:avLst/>
+            </a:prstGeom>
+            <a:solidFill>
+              <a:srgbClr val="D93839"/>
+            </a:solidFill>
+          </p:spPr>
+          <p:txBody>
+            <a:bodyPr wrap="square" rtlCol="0">
+              <a:spAutoFit/>
+            </a:bodyPr>
+            <a:lstStyle/>
+            <a:p>
+              <a:r>
+                <a:rPr lang="de-DE" b="1" dirty="0">
+                  <a:solidFill>
+                    <a:schemeClr val="bg1"/>
+                  </a:solidFill>
+                </a:rPr>
+                <a:t>-3.56</a:t>
+              </a:r>
+            </a:p>
+          </p:txBody>
+        </p:sp>
+        <p:sp>
+          <p:nvSpPr>
+            <p:cNvPr id="31" name="TextBox 30">
+              <a:extLst>
+                <a:ext uri="{FF2B5EF4-FFF2-40B4-BE49-F238E27FC236}">
+                  <a16:creationId xmlns:a16="http://schemas.microsoft.com/office/drawing/2014/main" id="{87ABBDF5-72FE-A44C-9D83-0193B9C44DD1}"/>
+                </a:ext>
+              </a:extLst>
+            </p:cNvPr>
+            <p:cNvSpPr txBox="1"/>
+            <p:nvPr/>
+          </p:nvSpPr>
+          <p:spPr>
+            <a:xfrm>
+              <a:off x="10940178" y="3600825"/>
+              <a:ext cx="631256" cy="369332"/>
+            </a:xfrm>
+            <a:prstGeom prst="rect">
+              <a:avLst/>
+            </a:prstGeom>
+            <a:solidFill>
+              <a:srgbClr val="0885C1"/>
+            </a:solidFill>
+          </p:spPr>
+          <p:txBody>
+            <a:bodyPr wrap="square" rtlCol="0">
+              <a:spAutoFit/>
+            </a:bodyPr>
+            <a:lstStyle/>
+            <a:p>
+              <a:r>
+                <a:rPr lang="de-DE" b="1" dirty="0">
+                  <a:solidFill>
+                    <a:schemeClr val="bg1"/>
+                  </a:solidFill>
+                </a:rPr>
+                <a:t>3.52</a:t>
+              </a:r>
+            </a:p>
+          </p:txBody>
+        </p:sp>
+        <p:sp>
+          <p:nvSpPr>
+            <p:cNvPr id="32" name="TextBox 31">
+              <a:extLst>
+                <a:ext uri="{FF2B5EF4-FFF2-40B4-BE49-F238E27FC236}">
+                  <a16:creationId xmlns:a16="http://schemas.microsoft.com/office/drawing/2014/main" id="{E15DC46A-61EE-F64D-91FE-E73A39A78E5D}"/>
+                </a:ext>
+              </a:extLst>
+            </p:cNvPr>
+            <p:cNvSpPr txBox="1"/>
+            <p:nvPr/>
+          </p:nvSpPr>
+          <p:spPr>
+            <a:xfrm>
+              <a:off x="9872983" y="4665338"/>
+              <a:ext cx="631256" cy="338554"/>
+            </a:xfrm>
+            <a:prstGeom prst="rect">
+              <a:avLst/>
+            </a:prstGeom>
+            <a:solidFill>
+              <a:srgbClr val="C30022"/>
+            </a:solidFill>
+          </p:spPr>
+          <p:txBody>
+            <a:bodyPr wrap="square" rtlCol="0">
+              <a:spAutoFit/>
+            </a:bodyPr>
+            <a:lstStyle/>
+            <a:p>
+              <a:r>
+                <a:rPr lang="de-DE" sz="1600" b="1" dirty="0">
+                  <a:solidFill>
+                    <a:schemeClr val="bg1"/>
+                  </a:solidFill>
+                </a:rPr>
+                <a:t>-4.21</a:t>
+              </a:r>
+            </a:p>
+          </p:txBody>
+        </p:sp>
+        <p:sp>
+          <p:nvSpPr>
+            <p:cNvPr id="33" name="TextBox 32">
+              <a:extLst>
+                <a:ext uri="{FF2B5EF4-FFF2-40B4-BE49-F238E27FC236}">
+                  <a16:creationId xmlns:a16="http://schemas.microsoft.com/office/drawing/2014/main" id="{33462C90-DB75-D143-A8F6-DB2EB6906D37}"/>
+                </a:ext>
+              </a:extLst>
+            </p:cNvPr>
+            <p:cNvSpPr txBox="1"/>
+            <p:nvPr/>
+          </p:nvSpPr>
+          <p:spPr>
+            <a:xfrm>
+              <a:off x="10966099" y="4673015"/>
+              <a:ext cx="631256" cy="338554"/>
+            </a:xfrm>
+            <a:prstGeom prst="rect">
+              <a:avLst/>
+            </a:prstGeom>
+            <a:solidFill>
+              <a:srgbClr val="006AB4"/>
+            </a:solidFill>
+          </p:spPr>
+          <p:txBody>
+            <a:bodyPr wrap="square" rtlCol="0">
+              <a:spAutoFit/>
+            </a:bodyPr>
+            <a:lstStyle/>
+            <a:p>
+              <a:r>
+                <a:rPr lang="de-DE" sz="1600" b="1" dirty="0">
+                  <a:solidFill>
+                    <a:schemeClr val="bg1"/>
+                  </a:solidFill>
+                </a:rPr>
+                <a:t>4.15</a:t>
+              </a:r>
+            </a:p>
+          </p:txBody>
+        </p:sp>
+      </p:grpSp>
     </p:spTree>
     <p:extLst>
       <p:ext uri="{BB962C8B-B14F-4D97-AF65-F5344CB8AC3E}">

</xml_diff>